<commit_message>
Updated screen shots and added pdf
</commit_message>
<xml_diff>
--- a/Modulewijzer/Grand Omega Tips V1.pptx
+++ b/Modulewijzer/Grand Omega Tips V1.pptx
@@ -309,7 +309,7 @@
           <a:p>
             <a:fld id="{824938B4-11E6-4413-93CB-781A76DF8AA0}" type="datetimeFigureOut">
               <a:rPr lang="en-US" smtClean="0"/>
-              <a:t>2/6/2019</a:t>
+              <a:t>2/12/2019</a:t>
             </a:fld>
             <a:endParaRPr lang="en-US"/>
           </a:p>
@@ -537,7 +537,7 @@
           <a:p>
             <a:fld id="{824938B4-11E6-4413-93CB-781A76DF8AA0}" type="datetimeFigureOut">
               <a:rPr lang="en-US" smtClean="0"/>
-              <a:t>2/6/2019</a:t>
+              <a:t>2/12/2019</a:t>
             </a:fld>
             <a:endParaRPr lang="en-US"/>
           </a:p>
@@ -717,7 +717,7 @@
           <a:p>
             <a:fld id="{824938B4-11E6-4413-93CB-781A76DF8AA0}" type="datetimeFigureOut">
               <a:rPr lang="en-US" smtClean="0"/>
-              <a:t>2/6/2019</a:t>
+              <a:t>2/12/2019</a:t>
             </a:fld>
             <a:endParaRPr lang="en-US"/>
           </a:p>
@@ -887,7 +887,7 @@
           <a:p>
             <a:fld id="{824938B4-11E6-4413-93CB-781A76DF8AA0}" type="datetimeFigureOut">
               <a:rPr lang="en-US" smtClean="0"/>
-              <a:t>2/6/2019</a:t>
+              <a:t>2/12/2019</a:t>
             </a:fld>
             <a:endParaRPr lang="en-US"/>
           </a:p>
@@ -1141,7 +1141,7 @@
           <a:p>
             <a:fld id="{824938B4-11E6-4413-93CB-781A76DF8AA0}" type="datetimeFigureOut">
               <a:rPr lang="en-US" smtClean="0"/>
-              <a:t>2/6/2019</a:t>
+              <a:t>2/12/2019</a:t>
             </a:fld>
             <a:endParaRPr lang="en-US"/>
           </a:p>
@@ -1467,7 +1467,7 @@
           <a:p>
             <a:fld id="{824938B4-11E6-4413-93CB-781A76DF8AA0}" type="datetimeFigureOut">
               <a:rPr lang="en-US" smtClean="0"/>
-              <a:t>2/6/2019</a:t>
+              <a:t>2/12/2019</a:t>
             </a:fld>
             <a:endParaRPr lang="en-US"/>
           </a:p>
@@ -1918,7 +1918,7 @@
           <a:p>
             <a:fld id="{824938B4-11E6-4413-93CB-781A76DF8AA0}" type="datetimeFigureOut">
               <a:rPr lang="en-US" smtClean="0"/>
-              <a:t>2/6/2019</a:t>
+              <a:t>2/12/2019</a:t>
             </a:fld>
             <a:endParaRPr lang="en-US"/>
           </a:p>
@@ -2036,7 +2036,7 @@
           <a:p>
             <a:fld id="{824938B4-11E6-4413-93CB-781A76DF8AA0}" type="datetimeFigureOut">
               <a:rPr lang="en-US" smtClean="0"/>
-              <a:t>2/6/2019</a:t>
+              <a:t>2/12/2019</a:t>
             </a:fld>
             <a:endParaRPr lang="en-US"/>
           </a:p>
@@ -2131,7 +2131,7 @@
           <a:p>
             <a:fld id="{824938B4-11E6-4413-93CB-781A76DF8AA0}" type="datetimeFigureOut">
               <a:rPr lang="en-US" smtClean="0"/>
-              <a:t>2/6/2019</a:t>
+              <a:t>2/12/2019</a:t>
             </a:fld>
             <a:endParaRPr lang="en-US"/>
           </a:p>
@@ -2418,7 +2418,7 @@
           <a:p>
             <a:fld id="{824938B4-11E6-4413-93CB-781A76DF8AA0}" type="datetimeFigureOut">
               <a:rPr lang="en-US" smtClean="0"/>
-              <a:t>2/6/2019</a:t>
+              <a:t>2/12/2019</a:t>
             </a:fld>
             <a:endParaRPr lang="en-US"/>
           </a:p>
@@ -2740,7 +2740,7 @@
           <a:p>
             <a:fld id="{824938B4-11E6-4413-93CB-781A76DF8AA0}" type="datetimeFigureOut">
               <a:rPr lang="en-US" smtClean="0"/>
-              <a:t>2/6/2019</a:t>
+              <a:t>2/12/2019</a:t>
             </a:fld>
             <a:endParaRPr lang="en-US"/>
           </a:p>
@@ -2994,7 +2994,7 @@
           <a:p>
             <a:fld id="{824938B4-11E6-4413-93CB-781A76DF8AA0}" type="datetimeFigureOut">
               <a:rPr lang="en-US" smtClean="0"/>
-              <a:t>2/6/2019</a:t>
+              <a:t>2/12/2019</a:t>
             </a:fld>
             <a:endParaRPr lang="en-US"/>
           </a:p>
@@ -5345,7 +5345,15 @@
           <a:p>
             <a:r>
               <a:rPr lang="en-US" dirty="0" smtClean="0"/>
-              <a:t>When the breakpoint is yellow it means that the code on that line is just about to be run (executed) - it has not been run yet</a:t>
+              <a:t>When the breakpoint is </a:t>
+            </a:r>
+            <a:r>
+              <a:rPr lang="en-US" dirty="0" smtClean="0"/>
+              <a:t>yellow and the line is highlighted yellow </a:t>
+            </a:r>
+            <a:r>
+              <a:rPr lang="en-US" dirty="0" smtClean="0"/>
+              <a:t>it means that the code on that line is just about to be run (executed) - it has not been run yet</a:t>
             </a:r>
           </a:p>
           <a:p>
@@ -5380,30 +5388,6 @@
           </a:p>
         </p:txBody>
       </p:sp>
-      <p:pic>
-        <p:nvPicPr>
-          <p:cNvPr id="4" name="Picture 3"/>
-          <p:cNvPicPr>
-            <a:picLocks noChangeAspect="1"/>
-          </p:cNvPicPr>
-          <p:nvPr/>
-        </p:nvPicPr>
-        <p:blipFill>
-          <a:blip r:embed="rId2"/>
-          <a:stretch>
-            <a:fillRect/>
-          </a:stretch>
-        </p:blipFill>
-        <p:spPr>
-          <a:xfrm>
-            <a:off x="1485900" y="2643187"/>
-            <a:ext cx="4324350" cy="3819525"/>
-          </a:xfrm>
-          <a:prstGeom prst="rect">
-            <a:avLst/>
-          </a:prstGeom>
-        </p:spPr>
-      </p:pic>
       <p:cxnSp>
         <p:nvCxnSpPr>
           <p:cNvPr id="7" name="Straight Arrow Connector 6"/>
@@ -5412,7 +5396,7 @@
         </p:nvCxnSpPr>
         <p:spPr>
           <a:xfrm>
-            <a:off x="902039" y="5046133"/>
+            <a:off x="902039" y="5293495"/>
             <a:ext cx="643466" cy="0"/>
           </a:xfrm>
           <a:prstGeom prst="straightConnector1">
@@ -5437,6 +5421,30 @@
           </a:fontRef>
         </p:style>
       </p:cxnSp>
+      <p:pic>
+        <p:nvPicPr>
+          <p:cNvPr id="6" name="Picture 5"/>
+          <p:cNvPicPr>
+            <a:picLocks noChangeAspect="1"/>
+          </p:cNvPicPr>
+          <p:nvPr/>
+        </p:nvPicPr>
+        <p:blipFill>
+          <a:blip r:embed="rId2"/>
+          <a:stretch>
+            <a:fillRect/>
+          </a:stretch>
+        </p:blipFill>
+        <p:spPr>
+          <a:xfrm>
+            <a:off x="1545505" y="2809875"/>
+            <a:ext cx="4724806" cy="3671887"/>
+          </a:xfrm>
+          <a:prstGeom prst="rect">
+            <a:avLst/>
+          </a:prstGeom>
+        </p:spPr>
+      </p:pic>
     </p:spTree>
     <p:extLst>
       <p:ext uri="{BB962C8B-B14F-4D97-AF65-F5344CB8AC3E}">

</xml_diff>